<commit_message>
fixed some typos and the QR code
</commit_message>
<xml_diff>
--- a/Give And Take poster.pptx
+++ b/Give And Take poster.pptx
@@ -107,6 +107,11 @@
       </a:defRPr>
     </a:lvl9pPr>
   </p:defaultTextStyle>
+  <p:extLst>
+    <p:ext uri="{EFAFB233-063F-42B5-8137-9DF3F51BA10A}">
+      <p15:sldGuideLst xmlns:p15="http://schemas.microsoft.com/office/powerpoint/2012/main"/>
+    </p:ext>
+  </p:extLst>
 </p:presentation>
 </file>
 
@@ -192,7 +197,7 @@
           <a:p>
             <a:fld id="{73BC9478-6C76-4B64-A645-D6EED91119E0}" type="datetimeFigureOut">
               <a:rPr lang="LID4096" smtClean="0"/>
-              <a:t>05/17/2023</a:t>
+              <a:t>05/18/2023</a:t>
             </a:fld>
             <a:endParaRPr lang="LID4096"/>
           </a:p>
@@ -7092,8 +7097,8 @@
         </p:nvSpPr>
         <p:spPr>
           <a:xfrm>
-            <a:off x="126363" y="1690535"/>
-            <a:ext cx="2189459" cy="1299557"/>
+            <a:off x="79715" y="1690535"/>
+            <a:ext cx="2236107" cy="1299557"/>
           </a:xfrm>
           <a:prstGeom prst="rect">
             <a:avLst/>
@@ -7123,7 +7128,7 @@
                 <a:cs typeface="Arial"/>
                 <a:sym typeface="Arial"/>
               </a:rPr>
-              <a:t>Many times requests and events depend on location, for example, seeking a partner for solving a math task, to study to sociology test or to seek volunteers for helping elderly near the campus. There is a need to conveniently filter opportunities by location.</a:t>
+              <a:t>Requests and events often depend on location, for example seeking a partner in the university library solving to solve a math task, to study to sociology test or to seek volunteers for helping elderly near the campus. There’s a need to conveniently filter opportunities by location.</a:t>
             </a:r>
             <a:endParaRPr sz="1200" kern="0" dirty="0">
               <a:solidFill>
@@ -7604,7 +7609,7 @@
                 <a:cs typeface="Arial"/>
                 <a:sym typeface="Arial"/>
               </a:rPr>
-              <a:t>a sharing social platform for Ariel University students/staff to connect, to “give and take” help and post events, easily based on location.</a:t>
+              <a:t>a sharing social platform for Ariel University students/staff to connect better, to “give and take” help and post events, easily based on location.</a:t>
             </a:r>
             <a:br>
               <a:rPr lang="en-US" sz="1200" kern="0" dirty="0">
@@ -8361,7 +8366,7 @@
                 <a:cs typeface="Anaheim"/>
                 <a:sym typeface="Anaheim"/>
               </a:rPr>
-              <a:t> watch users’ list &amp; users’ requests’ list</a:t>
+              <a:t> watch users list &amp; users requests list</a:t>
             </a:r>
             <a:br>
               <a:rPr lang="en-US" sz="1200" kern="0" dirty="0">
@@ -17560,42 +17565,6 @@
       </p:sp>
       <p:pic>
         <p:nvPicPr>
-          <p:cNvPr id="29" name="תמונה 28">
-            <a:extLst>
-              <a:ext uri="{FF2B5EF4-FFF2-40B4-BE49-F238E27FC236}">
-                <a16:creationId xmlns:a16="http://schemas.microsoft.com/office/drawing/2014/main" id="{91BDF3DF-79FD-4ABC-6604-CD664A31AC80}"/>
-              </a:ext>
-            </a:extLst>
-          </p:cNvPr>
-          <p:cNvPicPr>
-            <a:picLocks noChangeAspect="1"/>
-          </p:cNvPicPr>
-          <p:nvPr/>
-        </p:nvPicPr>
-        <p:blipFill>
-          <a:blip r:embed="rId4">
-            <a:extLst>
-              <a:ext uri="{28A0092B-C50C-407E-A947-70E740481C1C}">
-                <a14:useLocalDpi xmlns:a14="http://schemas.microsoft.com/office/drawing/2010/main" val="0"/>
-              </a:ext>
-            </a:extLst>
-          </a:blip>
-          <a:stretch>
-            <a:fillRect/>
-          </a:stretch>
-        </p:blipFill>
-        <p:spPr>
-          <a:xfrm>
-            <a:off x="10846887" y="5658885"/>
-            <a:ext cx="1030994" cy="1030994"/>
-          </a:xfrm>
-          <a:prstGeom prst="rect">
-            <a:avLst/>
-          </a:prstGeom>
-        </p:spPr>
-      </p:pic>
-      <p:pic>
-        <p:nvPicPr>
           <p:cNvPr id="31" name="תמונה 30">
             <a:extLst>
               <a:ext uri="{FF2B5EF4-FFF2-40B4-BE49-F238E27FC236}">
@@ -17609,7 +17578,7 @@
           <p:nvPr/>
         </p:nvPicPr>
         <p:blipFill>
-          <a:blip r:embed="rId5"/>
+          <a:blip r:embed="rId4"/>
           <a:stretch>
             <a:fillRect/>
           </a:stretch>
@@ -17664,7 +17633,7 @@
           <p:nvPr/>
         </p:nvPicPr>
         <p:blipFill>
-          <a:blip r:embed="rId6"/>
+          <a:blip r:embed="rId5"/>
           <a:stretch>
             <a:fillRect/>
           </a:stretch>
@@ -17719,7 +17688,7 @@
           <p:nvPr/>
         </p:nvPicPr>
         <p:blipFill>
-          <a:blip r:embed="rId7"/>
+          <a:blip r:embed="rId6"/>
           <a:stretch>
             <a:fillRect/>
           </a:stretch>
@@ -17925,7 +17894,7 @@
           <p:nvPr/>
         </p:nvPicPr>
         <p:blipFill>
-          <a:blip r:embed="rId8">
+          <a:blip r:embed="rId7">
             <a:extLst>
               <a:ext uri="{28A0092B-C50C-407E-A947-70E740481C1C}">
                 <a14:useLocalDpi xmlns:a14="http://schemas.microsoft.com/office/drawing/2010/main" val="0"/>
@@ -17972,7 +17941,7 @@
           <p:nvPr/>
         </p:nvPicPr>
         <p:blipFill>
-          <a:blip r:embed="rId9">
+          <a:blip r:embed="rId8">
             <a:extLst>
               <a:ext uri="{28A0092B-C50C-407E-A947-70E740481C1C}">
                 <a14:useLocalDpi xmlns:a14="http://schemas.microsoft.com/office/drawing/2010/main" val="0"/>
@@ -18019,7 +17988,7 @@
           <p:nvPr/>
         </p:nvPicPr>
         <p:blipFill>
-          <a:blip r:embed="rId10"/>
+          <a:blip r:embed="rId9"/>
           <a:stretch>
             <a:fillRect/>
           </a:stretch>
@@ -18049,7 +18018,7 @@
           <p:nvPr/>
         </p:nvPicPr>
         <p:blipFill>
-          <a:blip r:embed="rId11">
+          <a:blip r:embed="rId10">
             <a:extLst>
               <a:ext uri="{28A0092B-C50C-407E-A947-70E740481C1C}">
                 <a14:useLocalDpi xmlns:a14="http://schemas.microsoft.com/office/drawing/2010/main" val="0"/>
@@ -18096,7 +18065,7 @@
           <p:nvPr/>
         </p:nvPicPr>
         <p:blipFill>
-          <a:blip r:embed="rId12">
+          <a:blip r:embed="rId11">
             <a:extLst>
               <a:ext uri="{28A0092B-C50C-407E-A947-70E740481C1C}">
                 <a14:useLocalDpi xmlns:a14="http://schemas.microsoft.com/office/drawing/2010/main" val="0"/>
@@ -18126,6 +18095,42 @@
               </a14:hiddenFill>
             </a:ext>
           </a:extLst>
+        </p:spPr>
+      </p:pic>
+      <p:pic>
+        <p:nvPicPr>
+          <p:cNvPr id="3" name="תמונה 2" descr="תמונה שמכילה דפוס, תפר&#10;&#10;התיאור נוצר באופן אוטומטי">
+            <a:extLst>
+              <a:ext uri="{FF2B5EF4-FFF2-40B4-BE49-F238E27FC236}">
+                <a16:creationId xmlns:a16="http://schemas.microsoft.com/office/drawing/2014/main" id="{6CA645DB-E98C-601B-BE13-3AC403C680EF}"/>
+              </a:ext>
+            </a:extLst>
+          </p:cNvPr>
+          <p:cNvPicPr>
+            <a:picLocks noChangeAspect="1"/>
+          </p:cNvPicPr>
+          <p:nvPr/>
+        </p:nvPicPr>
+        <p:blipFill>
+          <a:blip r:embed="rId12">
+            <a:extLst>
+              <a:ext uri="{28A0092B-C50C-407E-A947-70E740481C1C}">
+                <a14:useLocalDpi xmlns:a14="http://schemas.microsoft.com/office/drawing/2010/main" val="0"/>
+              </a:ext>
+            </a:extLst>
+          </a:blip>
+          <a:stretch>
+            <a:fillRect/>
+          </a:stretch>
+        </p:blipFill>
+        <p:spPr>
+          <a:xfrm>
+            <a:off x="10852838" y="5827356"/>
+            <a:ext cx="815109" cy="815109"/>
+          </a:xfrm>
+          <a:prstGeom prst="rect">
+            <a:avLst/>
+          </a:prstGeom>
         </p:spPr>
       </p:pic>
     </p:spTree>

</xml_diff>

<commit_message>
remove duplicate and moved some items
</commit_message>
<xml_diff>
--- a/Give And Take poster.pptx
+++ b/Give And Take poster.pptx
@@ -6553,7 +6553,7 @@
         </p:nvSpPr>
         <p:spPr>
           <a:xfrm flipH="1">
-            <a:off x="8864956" y="1161151"/>
+            <a:off x="8853632" y="1157795"/>
             <a:ext cx="2497428" cy="511732"/>
           </a:xfrm>
           <a:prstGeom prst="rect">
@@ -7294,8 +7294,8 @@
         </p:nvSpPr>
         <p:spPr>
           <a:xfrm>
-            <a:off x="133015" y="5546076"/>
-            <a:ext cx="2825639" cy="1311924"/>
+            <a:off x="109760" y="5460463"/>
+            <a:ext cx="2453094" cy="1311924"/>
           </a:xfrm>
           <a:prstGeom prst="rect">
             <a:avLst/>
@@ -7489,7 +7489,7 @@
         </p:nvSpPr>
         <p:spPr>
           <a:xfrm>
-            <a:off x="-38887" y="5041052"/>
+            <a:off x="-77207" y="4925513"/>
             <a:ext cx="2467860" cy="314456"/>
           </a:xfrm>
           <a:prstGeom prst="rect">
@@ -7784,48 +7784,6 @@
       </p:sp>
       <p:sp>
         <p:nvSpPr>
-          <p:cNvPr id="129" name="Google Shape;129;p20"/>
-          <p:cNvSpPr txBox="1"/>
-          <p:nvPr/>
-        </p:nvSpPr>
-        <p:spPr>
-          <a:xfrm>
-            <a:off x="2453578" y="4155177"/>
-            <a:ext cx="1988708" cy="290275"/>
-          </a:xfrm>
-          <a:prstGeom prst="rect">
-            <a:avLst/>
-          </a:prstGeom>
-          <a:noFill/>
-          <a:ln>
-            <a:noFill/>
-          </a:ln>
-        </p:spPr>
-        <p:txBody>
-          <a:bodyPr spcFirstLastPara="1" wrap="square" lIns="36284" tIns="36284" rIns="36284" bIns="36284" anchor="ctr" anchorCtr="0">
-            <a:noAutofit/>
-          </a:bodyPr>
-          <a:lstStyle/>
-          <a:p>
-            <a:pPr algn="ctr" defTabSz="362925" rtl="0">
-              <a:buClr>
-                <a:srgbClr val="000000"/>
-              </a:buClr>
-            </a:pPr>
-            <a:endParaRPr sz="1200" kern="0" dirty="0">
-              <a:solidFill>
-                <a:srgbClr val="FFFFFF"/>
-              </a:solidFill>
-              <a:latin typeface="Anaheim"/>
-              <a:ea typeface="Anaheim"/>
-              <a:cs typeface="Anaheim"/>
-              <a:sym typeface="Anaheim"/>
-            </a:endParaRPr>
-          </a:p>
-        </p:txBody>
-      </p:sp>
-      <p:sp>
-        <p:nvSpPr>
           <p:cNvPr id="130" name="Google Shape;130;p20"/>
           <p:cNvSpPr txBox="1"/>
           <p:nvPr/>
@@ -7884,7 +7842,7 @@
         </p:nvSpPr>
         <p:spPr>
           <a:xfrm>
-            <a:off x="5351335" y="1302265"/>
+            <a:off x="5351335" y="1375790"/>
             <a:ext cx="2497428" cy="1023031"/>
           </a:xfrm>
           <a:prstGeom prst="rect">
@@ -7916,7 +7874,7 @@
                 <a:cs typeface="Anaheim"/>
                 <a:sym typeface="Anaheim"/>
               </a:rPr>
-              <a:t>Combining the power of a map service using Google Maps, with data storing using Firebase Real Time database, to create a system dedicated for Ariel University’s students and staff</a:t>
+              <a:t>Combining the power of a map service using Google Maps, with data storing using Firebase Real Time database, to create a system dedicated for Ariel University students and staff, where they can place events on a shared map</a:t>
             </a:r>
             <a:endParaRPr sz="1200" kern="0" dirty="0">
               <a:solidFill>
@@ -8084,7 +8042,7 @@
         </p:nvSpPr>
         <p:spPr>
           <a:xfrm>
-            <a:off x="8189524" y="2253653"/>
+            <a:off x="8189524" y="2034474"/>
             <a:ext cx="3922761" cy="2845863"/>
           </a:xfrm>
           <a:prstGeom prst="rect">
@@ -8163,7 +8121,7 @@
                 <a:cs typeface="Anaheim"/>
                 <a:sym typeface="Anaheim"/>
               </a:rPr>
-              <a:t>a reliable, live and responsive map shared by users</a:t>
+              <a:t>a reliable, live and interactive map shared by users</a:t>
             </a:r>
           </a:p>
           <a:p>
@@ -8248,7 +8206,7 @@
                 </a:solidFill>
                 <a:latin typeface="Anaheim"/>
               </a:rPr>
-              <a:t>notification of a new request or event according to the user's preferences:  on a chosen radius of live/ pre-determined location</a:t>
+              <a:t>notification of a new request or event according to the user's preferences, on a chosen radius of live or pre-determined location</a:t>
             </a:r>
             <a:br>
               <a:rPr lang="en-US" sz="1200" kern="0" dirty="0">
@@ -8400,7 +8358,7 @@
                 <a:cs typeface="Poppins ExtraBold"/>
                 <a:sym typeface="Poppins ExtraBold"/>
               </a:rPr>
-              <a:t>SECURITY:</a:t>
+              <a:t>SECURITY &amp; SAFETY:</a:t>
             </a:r>
           </a:p>
           <a:p>
@@ -8472,28 +8430,6 @@
                 <a:sym typeface="Anaheim"/>
               </a:rPr>
               <a:t>Requires phone number verification by SMS code</a:t>
-            </a:r>
-          </a:p>
-          <a:p>
-            <a:pPr marL="181463" indent="-146178" algn="l" defTabSz="362925" rtl="0">
-              <a:buClr>
-                <a:srgbClr val="80E4DC"/>
-              </a:buClr>
-              <a:buSzPts val="2200"/>
-              <a:buFont typeface="Anaheim"/>
-              <a:buChar char="●"/>
-            </a:pPr>
-            <a:r>
-              <a:rPr lang="en-US" sz="1200" kern="0" dirty="0">
-                <a:solidFill>
-                  <a:srgbClr val="FFFFFF"/>
-                </a:solidFill>
-                <a:latin typeface="Anaheim"/>
-                <a:ea typeface="Anaheim"/>
-                <a:cs typeface="Anaheim"/>
-                <a:sym typeface="Anaheim"/>
-              </a:rPr>
-              <a:t>Displays a notification on the phone about a new request or event according to the user's preferences.</a:t>
             </a:r>
           </a:p>
         </p:txBody>
@@ -8635,7 +8571,7 @@
         </p:nvSpPr>
         <p:spPr>
           <a:xfrm>
-            <a:off x="8831895" y="5849495"/>
+            <a:off x="8800886" y="5566242"/>
             <a:ext cx="1988708" cy="217766"/>
           </a:xfrm>
           <a:prstGeom prst="rect">
@@ -8689,7 +8625,7 @@
         </p:nvSpPr>
         <p:spPr>
           <a:xfrm>
-            <a:off x="8831895" y="6165546"/>
+            <a:off x="8853632" y="5917069"/>
             <a:ext cx="1988708" cy="432556"/>
           </a:xfrm>
           <a:prstGeom prst="rect">
@@ -17517,7 +17453,7 @@
         </p:nvSpPr>
         <p:spPr>
           <a:xfrm>
-            <a:off x="5698347" y="2488897"/>
+            <a:off x="5698347" y="2538790"/>
             <a:ext cx="1829579" cy="262769"/>
           </a:xfrm>
           <a:prstGeom prst="rect">
@@ -17585,7 +17521,7 @@
         </p:blipFill>
         <p:spPr>
           <a:xfrm>
-            <a:off x="2456074" y="1740827"/>
+            <a:off x="2489178" y="1711383"/>
             <a:ext cx="1385229" cy="2510614"/>
           </a:xfrm>
           <a:prstGeom prst="rect">
@@ -17640,7 +17576,7 @@
         </p:blipFill>
         <p:spPr>
           <a:xfrm>
-            <a:off x="3052251" y="4353303"/>
+            <a:off x="3052382" y="4332244"/>
             <a:ext cx="1545067" cy="2385545"/>
           </a:xfrm>
           <a:prstGeom prst="rect">
@@ -17739,7 +17675,7 @@
         </p:nvSpPr>
         <p:spPr>
           <a:xfrm>
-            <a:off x="5235412" y="2684517"/>
+            <a:off x="5227868" y="2770917"/>
             <a:ext cx="3603803" cy="1200329"/>
           </a:xfrm>
           <a:prstGeom prst="rect">
@@ -18032,7 +17968,7 @@
         </p:blipFill>
         <p:spPr bwMode="auto">
           <a:xfrm rot="307138">
-            <a:off x="11323220" y="4043752"/>
+            <a:off x="11323221" y="4032998"/>
             <a:ext cx="756811" cy="756811"/>
           </a:xfrm>
           <a:prstGeom prst="rect">
@@ -18079,7 +18015,7 @@
         </p:blipFill>
         <p:spPr bwMode="auto">
           <a:xfrm rot="21423691">
-            <a:off x="10725747" y="3404049"/>
+            <a:off x="10705039" y="3302485"/>
             <a:ext cx="603932" cy="728971"/>
           </a:xfrm>
           <a:prstGeom prst="rect">
@@ -18125,7 +18061,7 @@
         </p:blipFill>
         <p:spPr>
           <a:xfrm>
-            <a:off x="10852838" y="5827356"/>
+            <a:off x="10842340" y="5605172"/>
             <a:ext cx="815109" cy="815109"/>
           </a:xfrm>
           <a:prstGeom prst="rect">

</xml_diff>

<commit_message>
Added updated poster: pdf, pptx, doc
</commit_message>
<xml_diff>
--- a/Give And Take poster.pptx
+++ b/Give And Take poster.pptx
@@ -197,7 +197,7 @@
           <a:p>
             <a:fld id="{73BC9478-6C76-4B64-A645-D6EED91119E0}" type="datetimeFigureOut">
               <a:rPr lang="LID4096" smtClean="0"/>
-              <a:t>05/21/2023</a:t>
+              <a:t>05/23/2023</a:t>
             </a:fld>
             <a:endParaRPr lang="LID4096"/>
           </a:p>
@@ -6547,14 +6547,110 @@
       </p:grpSpPr>
       <p:sp>
         <p:nvSpPr>
+          <p:cNvPr id="132" name="Google Shape;132;p20"/>
+          <p:cNvSpPr/>
+          <p:nvPr/>
+        </p:nvSpPr>
+        <p:spPr>
+          <a:xfrm>
+            <a:off x="35444" y="624037"/>
+            <a:ext cx="533521" cy="533521"/>
+          </a:xfrm>
+          <a:prstGeom prst="ellipse">
+            <a:avLst/>
+          </a:prstGeom>
+          <a:solidFill>
+            <a:schemeClr val="accent4"/>
+          </a:solidFill>
+          <a:ln w="76200" cap="flat" cmpd="sng">
+            <a:solidFill>
+              <a:schemeClr val="accent3"/>
+            </a:solidFill>
+            <a:prstDash val="solid"/>
+            <a:round/>
+            <a:headEnd type="none" w="sm" len="sm"/>
+            <a:tailEnd type="none" w="sm" len="sm"/>
+          </a:ln>
+        </p:spPr>
+        <p:txBody>
+          <a:bodyPr spcFirstLastPara="1" wrap="square" lIns="36284" tIns="36284" rIns="36284" bIns="36284" anchor="ctr" anchorCtr="0">
+            <a:noAutofit/>
+          </a:bodyPr>
+          <a:lstStyle/>
+          <a:p>
+            <a:pPr algn="l" defTabSz="362925" rtl="0">
+              <a:buClr>
+                <a:srgbClr val="000000"/>
+              </a:buClr>
+            </a:pPr>
+            <a:endParaRPr sz="1200" kern="0">
+              <a:solidFill>
+                <a:srgbClr val="000000"/>
+              </a:solidFill>
+              <a:latin typeface="Arial"/>
+              <a:cs typeface="Arial"/>
+              <a:sym typeface="Arial"/>
+            </a:endParaRPr>
+          </a:p>
+        </p:txBody>
+      </p:sp>
+      <p:pic>
+        <p:nvPicPr>
+          <p:cNvPr id="1070" name="Picture 46" descr="Admin Svg Png Icon Free Download (#537428) - OnlineWebFonts.COM">
+            <a:extLst>
+              <a:ext uri="{FF2B5EF4-FFF2-40B4-BE49-F238E27FC236}">
+                <a16:creationId xmlns:a16="http://schemas.microsoft.com/office/drawing/2014/main" id="{BC3BBCD9-C639-9B0C-E161-0B349DF4C4F3}"/>
+              </a:ext>
+            </a:extLst>
+          </p:cNvPr>
+          <p:cNvPicPr>
+            <a:picLocks noChangeAspect="1" noChangeArrowheads="1"/>
+          </p:cNvPicPr>
+          <p:nvPr/>
+        </p:nvPicPr>
+        <p:blipFill>
+          <a:blip r:embed="rId3">
+            <a:extLst>
+              <a:ext uri="{28A0092B-C50C-407E-A947-70E740481C1C}">
+                <a14:useLocalDpi xmlns:a14="http://schemas.microsoft.com/office/drawing/2010/main" val="0"/>
+              </a:ext>
+            </a:extLst>
+          </a:blip>
+          <a:srcRect/>
+          <a:stretch>
+            <a:fillRect/>
+          </a:stretch>
+        </p:blipFill>
+        <p:spPr bwMode="auto">
+          <a:xfrm rot="21423691">
+            <a:off x="10761468" y="3543091"/>
+            <a:ext cx="603932" cy="728971"/>
+          </a:xfrm>
+          <a:prstGeom prst="rect">
+            <a:avLst/>
+          </a:prstGeom>
+          <a:noFill/>
+          <a:extLst>
+            <a:ext uri="{909E8E84-426E-40DD-AFC4-6F175D3DCCD1}">
+              <a14:hiddenFill xmlns:a14="http://schemas.microsoft.com/office/drawing/2010/main">
+                <a:solidFill>
+                  <a:srgbClr val="FFFFFF"/>
+                </a:solidFill>
+              </a14:hiddenFill>
+            </a:ext>
+          </a:extLst>
+        </p:spPr>
+      </p:pic>
+      <p:sp>
+        <p:nvSpPr>
           <p:cNvPr id="106" name="Google Shape;106;p20"/>
           <p:cNvSpPr txBox="1"/>
           <p:nvPr/>
         </p:nvSpPr>
         <p:spPr>
           <a:xfrm flipH="1">
-            <a:off x="8853632" y="1157795"/>
-            <a:ext cx="2497428" cy="511732"/>
+            <a:off x="8449333" y="1046812"/>
+            <a:ext cx="3066723" cy="476232"/>
           </a:xfrm>
           <a:prstGeom prst="rect">
             <a:avLst/>
@@ -6576,7 +6672,7 @@
               </a:buClr>
             </a:pPr>
             <a:r>
-              <a:rPr lang="en-US" sz="1400" kern="0" dirty="0">
+              <a:rPr lang="en-US" sz="1200" kern="0" dirty="0">
                 <a:solidFill>
                   <a:srgbClr val="FFFFFF"/>
                 </a:solidFill>
@@ -6585,7 +6681,7 @@
                 <a:cs typeface="Poppins ExtraBold"/>
                 <a:sym typeface="Poppins ExtraBold"/>
               </a:rPr>
-              <a:t>THIS  PLATORM PROVIDES…</a:t>
+              <a:t>The platform offers the following key functionalities:</a:t>
             </a:r>
           </a:p>
         </p:txBody>
@@ -6598,8 +6694,8 @@
         </p:nvSpPr>
         <p:spPr>
           <a:xfrm flipH="1">
-            <a:off x="8330413" y="1037726"/>
-            <a:ext cx="471489" cy="476133"/>
+            <a:off x="8000489" y="732278"/>
+            <a:ext cx="488744" cy="530635"/>
           </a:xfrm>
           <a:prstGeom prst="ellipse">
             <a:avLst/>
@@ -6647,8 +6743,8 @@
         </p:nvSpPr>
         <p:spPr>
           <a:xfrm flipH="1">
-            <a:off x="5360311" y="4284822"/>
-            <a:ext cx="2640919" cy="511732"/>
+            <a:off x="5122280" y="4762766"/>
+            <a:ext cx="3275323" cy="511732"/>
           </a:xfrm>
           <a:prstGeom prst="rect">
             <a:avLst/>
@@ -6679,29 +6775,8 @@
                 <a:cs typeface="Anaheim"/>
                 <a:sym typeface="Anaheim"/>
               </a:rPr>
-              <a:t>U</a:t>
+              <a:t>The system is developed using the MVC (Model-View-Controller) pattern for Android development and follows a 3-Tier Architecture approach.</a:t>
             </a:r>
-            <a:r>
-              <a:rPr lang="en" sz="1200" kern="0" dirty="0">
-                <a:solidFill>
-                  <a:srgbClr val="FFFFFF"/>
-                </a:solidFill>
-                <a:latin typeface="Anaheim"/>
-                <a:ea typeface="Anaheim"/>
-                <a:cs typeface="Anaheim"/>
-                <a:sym typeface="Anaheim"/>
-              </a:rPr>
-              <a:t>sing MVC Pattern for Android developing and 3-Tier Architecture:</a:t>
-            </a:r>
-            <a:endParaRPr sz="1200" kern="0" dirty="0">
-              <a:solidFill>
-                <a:srgbClr val="FFFFFF"/>
-              </a:solidFill>
-              <a:latin typeface="Anaheim"/>
-              <a:ea typeface="Anaheim"/>
-              <a:cs typeface="Anaheim"/>
-              <a:sym typeface="Anaheim"/>
-            </a:endParaRPr>
           </a:p>
         </p:txBody>
       </p:sp>
@@ -6713,7 +6788,7 @@
         </p:nvSpPr>
         <p:spPr>
           <a:xfrm flipH="1">
-            <a:off x="4675179" y="4160021"/>
+            <a:off x="4738682" y="4256733"/>
             <a:ext cx="471489" cy="476133"/>
           </a:xfrm>
           <a:prstGeom prst="ellipse">
@@ -6756,55 +6831,13 @@
       </p:sp>
       <p:sp>
         <p:nvSpPr>
-          <p:cNvPr id="111" name="Google Shape;111;p20"/>
-          <p:cNvSpPr txBox="1"/>
-          <p:nvPr/>
-        </p:nvSpPr>
-        <p:spPr>
-          <a:xfrm>
-            <a:off x="6866328" y="4615051"/>
-            <a:ext cx="1988708" cy="217766"/>
-          </a:xfrm>
-          <a:prstGeom prst="rect">
-            <a:avLst/>
-          </a:prstGeom>
-          <a:noFill/>
-          <a:ln>
-            <a:noFill/>
-          </a:ln>
-        </p:spPr>
-        <p:txBody>
-          <a:bodyPr spcFirstLastPara="1" wrap="square" lIns="36284" tIns="36284" rIns="36284" bIns="36284" anchor="ctr" anchorCtr="0">
-            <a:noAutofit/>
-          </a:bodyPr>
-          <a:lstStyle/>
-          <a:p>
-            <a:pPr algn="ctr" defTabSz="362925" rtl="0">
-              <a:buClr>
-                <a:srgbClr val="000000"/>
-              </a:buClr>
-            </a:pPr>
-            <a:endParaRPr sz="1200" kern="0" dirty="0">
-              <a:solidFill>
-                <a:srgbClr val="FFFFFF"/>
-              </a:solidFill>
-              <a:latin typeface="Anaheim"/>
-              <a:ea typeface="Anaheim"/>
-              <a:cs typeface="Anaheim"/>
-              <a:sym typeface="Anaheim"/>
-            </a:endParaRPr>
-          </a:p>
-        </p:txBody>
-      </p:sp>
-      <p:sp>
-        <p:nvSpPr>
           <p:cNvPr id="112" name="Google Shape;112;p20"/>
           <p:cNvSpPr txBox="1"/>
           <p:nvPr/>
         </p:nvSpPr>
         <p:spPr>
           <a:xfrm>
-            <a:off x="2453578" y="6111114"/>
+            <a:off x="2425979" y="5944860"/>
             <a:ext cx="1354103" cy="573407"/>
           </a:xfrm>
           <a:prstGeom prst="rect">
@@ -6846,7 +6879,7 @@
         </p:nvSpPr>
         <p:spPr>
           <a:xfrm>
-            <a:off x="121894" y="5759016"/>
+            <a:off x="94295" y="5592762"/>
             <a:ext cx="1946441" cy="217766"/>
           </a:xfrm>
           <a:prstGeom prst="rect">
@@ -6892,7 +6925,7 @@
         </p:nvSpPr>
         <p:spPr>
           <a:xfrm>
-            <a:off x="873098" y="100386"/>
+            <a:off x="845499" y="-65868"/>
             <a:ext cx="11115580" cy="593052"/>
           </a:xfrm>
           <a:prstGeom prst="rect">
@@ -6965,7 +6998,7 @@
         </p:nvSpPr>
         <p:spPr>
           <a:xfrm>
-            <a:off x="2110404" y="522762"/>
+            <a:off x="2104761" y="264076"/>
             <a:ext cx="8597055" cy="508042"/>
           </a:xfrm>
           <a:prstGeom prst="rect">
@@ -7021,7 +7054,7 @@
                 <a:cs typeface="Anaheim"/>
                 <a:sym typeface="Anaheim"/>
               </a:rPr>
-              <a:t>Shavit Luzon | Instructor: Saeed Asaly | Computer Science and Mathematics Final Project</a:t>
+              <a:t>Shavit Luzon | Supervisor: Saed Asaly | Computer Science and Mathematics Final Project</a:t>
             </a:r>
             <a:endParaRPr sz="1600" kern="0" dirty="0">
               <a:solidFill>
@@ -7043,7 +7076,7 @@
         </p:nvSpPr>
         <p:spPr>
           <a:xfrm>
-            <a:off x="733168" y="1031756"/>
+            <a:off x="467101" y="741482"/>
             <a:ext cx="1946441" cy="362904"/>
           </a:xfrm>
           <a:prstGeom prst="rect">
@@ -7097,8 +7130,8 @@
         </p:nvSpPr>
         <p:spPr>
           <a:xfrm>
-            <a:off x="100255" y="1534204"/>
-            <a:ext cx="2236107" cy="1654469"/>
+            <a:off x="94296" y="1264708"/>
+            <a:ext cx="2242052" cy="1654469"/>
           </a:xfrm>
           <a:prstGeom prst="rect">
             <a:avLst/>
@@ -7128,7 +7161,7 @@
                 <a:cs typeface="Arial"/>
                 <a:sym typeface="Arial"/>
               </a:rPr>
-              <a:t>Many times people need things that are location based, for example seeking a partner in the university's library to solve a math task, to study to sociology test or to seek volunteers for helping elderly near the campus. There’s a need to conveniently filter opportunities by location.</a:t>
+              <a:t>Give and Take is an app designed to fulfill location-based needs and connect individuals seeking specific assistance or resources. Whether it's finding a study partner in the university library to tackle a challenging math problem, preparing for a sociology test, or locating volunteers to support the elderly near your campus.</a:t>
             </a:r>
             <a:endParaRPr lang="en-US" sz="1200" kern="0" dirty="0">
               <a:solidFill>
@@ -7149,7 +7182,7 @@
         </p:nvSpPr>
         <p:spPr>
           <a:xfrm>
-            <a:off x="4647721" y="1010447"/>
+            <a:off x="4675813" y="714941"/>
             <a:ext cx="620864" cy="547972"/>
           </a:xfrm>
           <a:prstGeom prst="ellipse">
@@ -7198,7 +7231,7 @@
         </p:nvSpPr>
         <p:spPr>
           <a:xfrm>
-            <a:off x="105507" y="3328218"/>
+            <a:off x="-171636" y="3214516"/>
             <a:ext cx="1946441" cy="217766"/>
           </a:xfrm>
           <a:prstGeom prst="rect">
@@ -7252,7 +7285,7 @@
         </p:nvSpPr>
         <p:spPr>
           <a:xfrm>
-            <a:off x="221823" y="4082737"/>
+            <a:off x="194224" y="3916483"/>
             <a:ext cx="1946441" cy="217766"/>
           </a:xfrm>
           <a:prstGeom prst="rect">
@@ -7294,8 +7327,8 @@
         </p:nvSpPr>
         <p:spPr>
           <a:xfrm>
-            <a:off x="109760" y="5460463"/>
-            <a:ext cx="2453094" cy="1311924"/>
+            <a:off x="14035" y="5616108"/>
+            <a:ext cx="3120877" cy="1311924"/>
           </a:xfrm>
           <a:prstGeom prst="rect">
             <a:avLst/>
@@ -7329,38 +7362,7 @@
                 <a:cs typeface="Anaheim"/>
                 <a:sym typeface="Anaheim"/>
               </a:rPr>
-              <a:t>requests to be browsed and stored real time</a:t>
-            </a:r>
-            <a:endParaRPr sz="1200" kern="0" dirty="0">
-              <a:solidFill>
-                <a:srgbClr val="FFFFFF"/>
-              </a:solidFill>
-              <a:latin typeface="Anaheim"/>
-              <a:ea typeface="Anaheim"/>
-              <a:cs typeface="Anaheim"/>
-              <a:sym typeface="Anaheim"/>
-            </a:endParaRPr>
-          </a:p>
-          <a:p>
-            <a:pPr marL="108878" indent="-109886" algn="l" defTabSz="362925" rtl="0">
-              <a:buClr>
-                <a:srgbClr val="80E4DC"/>
-              </a:buClr>
-              <a:buSzPts val="2200"/>
-              <a:buFont typeface="Anaheim"/>
-              <a:buChar char="●"/>
-            </a:pPr>
-            <a:r>
-              <a:rPr lang="en-US" sz="1200" kern="0" dirty="0">
-                <a:solidFill>
-                  <a:srgbClr val="FFFFFF"/>
-                </a:solidFill>
-                <a:latin typeface="Anaheim"/>
-                <a:ea typeface="Anaheim"/>
-                <a:cs typeface="Anaheim"/>
-                <a:sym typeface="Anaheim"/>
-              </a:rPr>
-              <a:t>location visualized</a:t>
+              <a:t> Real-time browsing and storage of requests.</a:t>
             </a:r>
           </a:p>
           <a:p>
@@ -7382,19 +7384,7 @@
                 <a:cs typeface="Anaheim"/>
                 <a:sym typeface="Anaheim"/>
               </a:rPr>
-              <a:t>t</a:t>
-            </a:r>
-            <a:r>
-              <a:rPr lang="en" sz="1200" kern="0" dirty="0">
-                <a:solidFill>
-                  <a:srgbClr val="FFFFFF"/>
-                </a:solidFill>
-                <a:latin typeface="Anaheim"/>
-                <a:ea typeface="Anaheim"/>
-                <a:cs typeface="Anaheim"/>
-                <a:sym typeface="Anaheim"/>
-              </a:rPr>
-              <a:t>o be kept an exclusive, safe place</a:t>
+              <a:t> Visualization of location information.</a:t>
             </a:r>
           </a:p>
           <a:p>
@@ -7416,7 +7406,7 @@
                 <a:cs typeface="Anaheim"/>
                 <a:sym typeface="Anaheim"/>
               </a:rPr>
-              <a:t>Users allowed to communicate</a:t>
+              <a:t> Ensuring the system maintains an exclusive and secure environment.</a:t>
             </a:r>
           </a:p>
           <a:p>
@@ -7438,7 +7428,7 @@
                 <a:cs typeface="Anaheim"/>
                 <a:sym typeface="Anaheim"/>
               </a:rPr>
-              <a:t>Admin users managing the app</a:t>
+              <a:t> Facilitating communication between users.</a:t>
             </a:r>
           </a:p>
           <a:p>
@@ -7450,26 +7440,27 @@
               <a:buFont typeface="Anaheim"/>
               <a:buChar char="●"/>
             </a:pPr>
-            <a:endParaRPr lang="en-US" sz="1200" kern="0" dirty="0">
-              <a:solidFill>
-                <a:srgbClr val="FFFFFF"/>
-              </a:solidFill>
-              <a:latin typeface="Anaheim"/>
-              <a:ea typeface="Anaheim"/>
-              <a:cs typeface="Anaheim"/>
-              <a:sym typeface="Anaheim"/>
-            </a:endParaRPr>
+            <a:r>
+              <a:rPr lang="en-US" sz="1200" kern="0" dirty="0">
+                <a:solidFill>
+                  <a:srgbClr val="FFFFFF"/>
+                </a:solidFill>
+                <a:latin typeface="Anaheim"/>
+                <a:ea typeface="Anaheim"/>
+                <a:cs typeface="Anaheim"/>
+                <a:sym typeface="Anaheim"/>
+              </a:rPr>
+              <a:t>Provision of administrative user roles to manage the app.</a:t>
+            </a:r>
           </a:p>
           <a:p>
-            <a:pPr marL="108878" indent="-109886" algn="l" defTabSz="362925" rtl="0">
+            <a:pPr algn="l" defTabSz="362925" rtl="0">
               <a:buClr>
                 <a:srgbClr val="80E4DC"/>
               </a:buClr>
               <a:buSzPts val="2200"/>
-              <a:buFont typeface="Anaheim"/>
-              <a:buChar char="●"/>
             </a:pPr>
-            <a:endParaRPr sz="1200" kern="0" dirty="0">
+            <a:endParaRPr lang="en-US" sz="1200" kern="0" dirty="0">
               <a:solidFill>
                 <a:srgbClr val="FFFFFF"/>
               </a:solidFill>
@@ -7489,7 +7480,7 @@
         </p:nvSpPr>
         <p:spPr>
           <a:xfrm>
-            <a:off x="-77207" y="4925513"/>
+            <a:off x="22207" y="5220627"/>
             <a:ext cx="2467860" cy="314456"/>
           </a:xfrm>
           <a:prstGeom prst="rect">
@@ -7521,40 +7512,8 @@
                 <a:cs typeface="Poppins ExtraBold"/>
                 <a:sym typeface="Poppins ExtraBold"/>
               </a:rPr>
-              <a:t>CONSIDERATIONS</a:t>
+              <a:t>SYSTEM CONSIDERATIONS</a:t>
             </a:r>
-            <a:br>
-              <a:rPr lang="en-US" sz="1400" kern="0" dirty="0">
-                <a:solidFill>
-                  <a:srgbClr val="FFFFFF"/>
-                </a:solidFill>
-                <a:latin typeface="Poppins ExtraBold"/>
-                <a:ea typeface="Poppins ExtraBold"/>
-                <a:cs typeface="Poppins ExtraBold"/>
-                <a:sym typeface="Poppins ExtraBold"/>
-              </a:rPr>
-            </a:br>
-            <a:r>
-              <a:rPr lang="en-US" sz="1200" kern="0" dirty="0">
-                <a:solidFill>
-                  <a:srgbClr val="FFFFFF"/>
-                </a:solidFill>
-                <a:latin typeface="Poppins ExtraBold"/>
-                <a:ea typeface="Poppins ExtraBold"/>
-                <a:cs typeface="Poppins ExtraBold"/>
-                <a:sym typeface="Poppins ExtraBold"/>
-              </a:rPr>
-              <a:t>THE SYSTEM NEEDS…</a:t>
-            </a:r>
-            <a:endParaRPr lang="en-US" sz="1400" kern="0" dirty="0">
-              <a:solidFill>
-                <a:srgbClr val="FFFFFF"/>
-              </a:solidFill>
-              <a:latin typeface="Poppins ExtraBold"/>
-              <a:ea typeface="Poppins ExtraBold"/>
-              <a:cs typeface="Poppins ExtraBold"/>
-              <a:sym typeface="Poppins ExtraBold"/>
-            </a:endParaRPr>
           </a:p>
         </p:txBody>
       </p:sp>
@@ -7566,8 +7525,8 @@
         </p:nvSpPr>
         <p:spPr>
           <a:xfrm>
-            <a:off x="161953" y="3529782"/>
-            <a:ext cx="2189459" cy="1175237"/>
+            <a:off x="49788" y="3702185"/>
+            <a:ext cx="2517933" cy="1175237"/>
           </a:xfrm>
           <a:prstGeom prst="rect">
             <a:avLst/>
@@ -7589,7 +7548,7 @@
               </a:buClr>
             </a:pPr>
             <a:r>
-              <a:rPr lang="en" sz="1200" kern="0" dirty="0">
+              <a:rPr lang="en-US" sz="1200" kern="0" dirty="0">
                 <a:solidFill>
                   <a:srgbClr val="FFFFFF"/>
                 </a:solidFill>
@@ -7598,29 +7557,8 @@
                 <a:cs typeface="Anaheim"/>
                 <a:sym typeface="Anaheim"/>
               </a:rPr>
-              <a:t>To supply </a:t>
+              <a:t>To create a robust platform that facilitates seamless connections and resource sharing within local communities. By leveraging location-based filtering, our aim is to provide users with a convenient and efficient means to find and offer assistance, exchange resources and engage in reciprocal acts of kindness.</a:t>
             </a:r>
-            <a:r>
-              <a:rPr lang="en-US" sz="1200" kern="0" dirty="0">
-                <a:solidFill>
-                  <a:srgbClr val="FFFFFF"/>
-                </a:solidFill>
-                <a:latin typeface="Anaheim"/>
-                <a:cs typeface="Arial"/>
-                <a:sym typeface="Arial"/>
-              </a:rPr>
-              <a:t>a sharing social platform for Ariel University students/staff to connect better, to “give and take” help and post events, easily based on location.</a:t>
-            </a:r>
-            <a:br>
-              <a:rPr lang="en-US" sz="1200" kern="0" dirty="0">
-                <a:solidFill>
-                  <a:srgbClr val="FFFFFF"/>
-                </a:solidFill>
-                <a:latin typeface="Anaheim"/>
-                <a:cs typeface="Arial"/>
-                <a:sym typeface="Arial"/>
-              </a:rPr>
-            </a:br>
             <a:endParaRPr sz="1200" kern="0" dirty="0">
               <a:solidFill>
                 <a:srgbClr val="FFFFFF"/>
@@ -7640,7 +7578,7 @@
         </p:nvSpPr>
         <p:spPr>
           <a:xfrm>
-            <a:off x="2613119" y="1049481"/>
+            <a:off x="2587922" y="726831"/>
             <a:ext cx="1985493" cy="362904"/>
           </a:xfrm>
           <a:prstGeom prst="rect">
@@ -7694,7 +7632,7 @@
         </p:nvSpPr>
         <p:spPr>
           <a:xfrm>
-            <a:off x="2602895" y="1368005"/>
+            <a:off x="2574726" y="1008120"/>
             <a:ext cx="1984184" cy="217766"/>
           </a:xfrm>
           <a:prstGeom prst="rect">
@@ -7742,55 +7680,13 @@
       </p:sp>
       <p:sp>
         <p:nvSpPr>
-          <p:cNvPr id="128" name="Google Shape;128;p20"/>
-          <p:cNvSpPr txBox="1"/>
-          <p:nvPr/>
-        </p:nvSpPr>
-        <p:spPr>
-          <a:xfrm>
-            <a:off x="2453578" y="3937283"/>
-            <a:ext cx="1988708" cy="217766"/>
-          </a:xfrm>
-          <a:prstGeom prst="rect">
-            <a:avLst/>
-          </a:prstGeom>
-          <a:noFill/>
-          <a:ln>
-            <a:noFill/>
-          </a:ln>
-        </p:spPr>
-        <p:txBody>
-          <a:bodyPr spcFirstLastPara="1" wrap="square" lIns="36284" tIns="36284" rIns="36284" bIns="36284" anchor="ctr" anchorCtr="0">
-            <a:noAutofit/>
-          </a:bodyPr>
-          <a:lstStyle/>
-          <a:p>
-            <a:pPr algn="ctr" defTabSz="362925" rtl="0">
-              <a:buClr>
-                <a:srgbClr val="000000"/>
-              </a:buClr>
-            </a:pPr>
-            <a:endParaRPr sz="1200" kern="0" dirty="0">
-              <a:solidFill>
-                <a:srgbClr val="FFFFFF"/>
-              </a:solidFill>
-              <a:latin typeface="Poppins ExtraBold"/>
-              <a:ea typeface="Poppins ExtraBold"/>
-              <a:cs typeface="Poppins ExtraBold"/>
-              <a:sym typeface="Poppins ExtraBold"/>
-            </a:endParaRPr>
-          </a:p>
-        </p:txBody>
-      </p:sp>
-      <p:sp>
-        <p:nvSpPr>
           <p:cNvPr id="130" name="Google Shape;130;p20"/>
           <p:cNvSpPr txBox="1"/>
           <p:nvPr/>
         </p:nvSpPr>
         <p:spPr>
           <a:xfrm>
-            <a:off x="5344881" y="1085843"/>
+            <a:off x="5408934" y="799400"/>
             <a:ext cx="1988708" cy="217766"/>
           </a:xfrm>
           <a:prstGeom prst="rect">
@@ -7842,8 +7738,8 @@
         </p:nvSpPr>
         <p:spPr>
           <a:xfrm>
-            <a:off x="5351335" y="1375790"/>
-            <a:ext cx="2497428" cy="1023031"/>
+            <a:off x="5279550" y="1264432"/>
+            <a:ext cx="2916782" cy="1023031"/>
           </a:xfrm>
           <a:prstGeom prst="rect">
             <a:avLst/>
@@ -7865,7 +7761,7 @@
               </a:buClr>
             </a:pPr>
             <a:r>
-              <a:rPr lang="en" sz="1200" kern="0" dirty="0">
+              <a:rPr lang="en-US" sz="1200" kern="0" dirty="0">
                 <a:solidFill>
                   <a:srgbClr val="FFFFFF"/>
                 </a:solidFill>
@@ -7874,7 +7770,29 @@
                 <a:cs typeface="Anaheim"/>
                 <a:sym typeface="Anaheim"/>
               </a:rPr>
-              <a:t>Combining the power of a map service using Google Maps, with data storing using Firebase Real Time database, to create a system dedicated for Ariel University students and staff, where they can place events on a shared map</a:t>
+              <a:t>Integrating Google Maps as a map service and utilizing Firebase Real Time database for efficient data storage, to develop a dedicated system specifically designed for Ariel University students and staff. Through this system, users will have the ability to mark and share events on a </a:t>
+            </a:r>
+            <a:r>
+              <a:rPr lang="en-US" sz="1200" kern="0" dirty="0">
+                <a:solidFill>
+                  <a:srgbClr val="FFFFFF"/>
+                </a:solidFill>
+                <a:latin typeface="Anaheim"/>
+                <a:sym typeface="Anaheim"/>
+              </a:rPr>
+              <a:t>collaborative</a:t>
+            </a:r>
+            <a:r>
+              <a:rPr lang="en-US" sz="1200" kern="0" dirty="0">
+                <a:solidFill>
+                  <a:srgbClr val="FFFFFF"/>
+                </a:solidFill>
+                <a:latin typeface="Anaheim"/>
+                <a:ea typeface="Anaheim"/>
+                <a:cs typeface="Anaheim"/>
+                <a:sym typeface="Anaheim"/>
+              </a:rPr>
+              <a:t> map. </a:t>
             </a:r>
             <a:endParaRPr sz="1200" kern="0" dirty="0">
               <a:solidFill>
@@ -7890,62 +7808,13 @@
       </p:sp>
       <p:sp>
         <p:nvSpPr>
-          <p:cNvPr id="132" name="Google Shape;132;p20"/>
-          <p:cNvSpPr/>
-          <p:nvPr/>
-        </p:nvSpPr>
-        <p:spPr>
-          <a:xfrm>
-            <a:off x="189423" y="934239"/>
-            <a:ext cx="533521" cy="533521"/>
-          </a:xfrm>
-          <a:prstGeom prst="ellipse">
-            <a:avLst/>
-          </a:prstGeom>
-          <a:solidFill>
-            <a:schemeClr val="accent4"/>
-          </a:solidFill>
-          <a:ln w="76200" cap="flat" cmpd="sng">
-            <a:solidFill>
-              <a:schemeClr val="accent3"/>
-            </a:solidFill>
-            <a:prstDash val="solid"/>
-            <a:round/>
-            <a:headEnd type="none" w="sm" len="sm"/>
-            <a:tailEnd type="none" w="sm" len="sm"/>
-          </a:ln>
-        </p:spPr>
-        <p:txBody>
-          <a:bodyPr spcFirstLastPara="1" wrap="square" lIns="36284" tIns="36284" rIns="36284" bIns="36284" anchor="ctr" anchorCtr="0">
-            <a:noAutofit/>
-          </a:bodyPr>
-          <a:lstStyle/>
-          <a:p>
-            <a:pPr algn="l" defTabSz="362925" rtl="0">
-              <a:buClr>
-                <a:srgbClr val="000000"/>
-              </a:buClr>
-            </a:pPr>
-            <a:endParaRPr sz="1200" kern="0">
-              <a:solidFill>
-                <a:srgbClr val="000000"/>
-              </a:solidFill>
-              <a:latin typeface="Arial"/>
-              <a:cs typeface="Arial"/>
-              <a:sym typeface="Arial"/>
-            </a:endParaRPr>
-          </a:p>
-        </p:txBody>
-      </p:sp>
-      <p:sp>
-        <p:nvSpPr>
           <p:cNvPr id="136" name="Google Shape;136;p20"/>
           <p:cNvSpPr txBox="1"/>
           <p:nvPr/>
         </p:nvSpPr>
         <p:spPr>
           <a:xfrm>
-            <a:off x="5245403" y="4052003"/>
+            <a:off x="5014796" y="4466170"/>
             <a:ext cx="2047379" cy="274209"/>
           </a:xfrm>
           <a:prstGeom prst="rect">
@@ -7977,7 +7846,7 @@
                 <a:cs typeface="Poppins ExtraBold"/>
                 <a:sym typeface="Poppins ExtraBold"/>
               </a:rPr>
-              <a:t>MODULATION</a:t>
+              <a:t>SYSTEM DESIGN</a:t>
             </a:r>
           </a:p>
         </p:txBody>
@@ -7990,7 +7859,7 @@
         </p:nvSpPr>
         <p:spPr>
           <a:xfrm>
-            <a:off x="8831671" y="1079942"/>
+            <a:off x="8774303" y="782014"/>
             <a:ext cx="2277667" cy="217766"/>
           </a:xfrm>
           <a:prstGeom prst="rect">
@@ -8042,8 +7911,8 @@
         </p:nvSpPr>
         <p:spPr>
           <a:xfrm>
-            <a:off x="8241286" y="2080817"/>
-            <a:ext cx="3922761" cy="2845863"/>
+            <a:off x="8260997" y="2320685"/>
+            <a:ext cx="3819202" cy="2845863"/>
           </a:xfrm>
           <a:prstGeom prst="rect">
             <a:avLst/>
@@ -8073,121 +7942,8 @@
                   <a:srgbClr val="FFFFFF"/>
                 </a:solidFill>
                 <a:latin typeface="Anaheim"/>
-                <a:ea typeface="Anaheim"/>
-                <a:cs typeface="Anaheim"/>
-                <a:sym typeface="Anaheim"/>
               </a:rPr>
-              <a:t>users to create requests and manage their own</a:t>
-            </a:r>
-          </a:p>
-          <a:p>
-            <a:pPr marL="181463" indent="-146178" algn="l" defTabSz="362925" rtl="0">
-              <a:buClr>
-                <a:srgbClr val="80E4DC"/>
-              </a:buClr>
-              <a:buSzPts val="2200"/>
-              <a:buFont typeface="Anaheim"/>
-              <a:buChar char="●"/>
-            </a:pPr>
-            <a:r>
-              <a:rPr lang="en-US" sz="1200" kern="0" dirty="0">
-                <a:solidFill>
-                  <a:srgbClr val="FFFFFF"/>
-                </a:solidFill>
-                <a:latin typeface="Anaheim"/>
-                <a:ea typeface="Anaheim"/>
-                <a:cs typeface="Anaheim"/>
-                <a:sym typeface="Anaheim"/>
-              </a:rPr>
-              <a:t>user registration and login with stored details</a:t>
-            </a:r>
-          </a:p>
-          <a:p>
-            <a:pPr marL="181463" indent="-146178" algn="l" defTabSz="362925" rtl="0">
-              <a:buClr>
-                <a:srgbClr val="80E4DC"/>
-              </a:buClr>
-              <a:buSzPts val="2200"/>
-              <a:buFont typeface="Anaheim"/>
-              <a:buChar char="●"/>
-            </a:pPr>
-            <a:r>
-              <a:rPr lang="en-US" sz="1200" kern="0" dirty="0">
-                <a:solidFill>
-                  <a:srgbClr val="FFFFFF"/>
-                </a:solidFill>
-                <a:latin typeface="Anaheim"/>
-                <a:ea typeface="Anaheim"/>
-                <a:cs typeface="Anaheim"/>
-                <a:sym typeface="Anaheim"/>
-              </a:rPr>
-              <a:t>a reliable, live and interactive map shared by users</a:t>
-            </a:r>
-          </a:p>
-          <a:p>
-            <a:pPr marL="181463" indent="-146178" algn="l" defTabSz="362925" rtl="0">
-              <a:buClr>
-                <a:srgbClr val="80E4DC"/>
-              </a:buClr>
-              <a:buSzPts val="2200"/>
-              <a:buFont typeface="Anaheim"/>
-              <a:buChar char="●"/>
-            </a:pPr>
-            <a:r>
-              <a:rPr lang="en-US" sz="1200" kern="0" dirty="0">
-                <a:solidFill>
-                  <a:srgbClr val="FFFFFF"/>
-                </a:solidFill>
-                <a:latin typeface="Anaheim"/>
-                <a:ea typeface="Anaheim"/>
-                <a:cs typeface="Anaheim"/>
-                <a:sym typeface="Anaheim"/>
-              </a:rPr>
-              <a:t>communication between the users</a:t>
-            </a:r>
-          </a:p>
-          <a:p>
-            <a:pPr marL="181463" indent="-146178" algn="l" defTabSz="362925" rtl="0">
-              <a:buClr>
-                <a:srgbClr val="80E4DC"/>
-              </a:buClr>
-              <a:buSzPts val="2200"/>
-              <a:buFont typeface="Anaheim"/>
-              <a:buChar char="●"/>
-            </a:pPr>
-            <a:r>
-              <a:rPr lang="en-US" sz="1200" kern="0" dirty="0">
-                <a:solidFill>
-                  <a:srgbClr val="FFFFFF"/>
-                </a:solidFill>
-                <a:latin typeface="Anaheim"/>
-                <a:ea typeface="Anaheim"/>
-                <a:cs typeface="Anaheim"/>
-                <a:sym typeface="Anaheim"/>
-              </a:rPr>
-              <a:t>requests display by dedicated icons on map</a:t>
-            </a:r>
-          </a:p>
-          <a:p>
-            <a:pPr marL="181463" indent="-146178" algn="l" defTabSz="362925" rtl="0">
-              <a:buClr>
-                <a:srgbClr val="80E4DC"/>
-              </a:buClr>
-              <a:buSzPts val="2200"/>
-              <a:buFont typeface="Anaheim"/>
-              <a:buChar char="●"/>
-            </a:pPr>
-            <a:r>
-              <a:rPr lang="en-US" sz="1200" kern="0" dirty="0">
-                <a:solidFill>
-                  <a:srgbClr val="FFFFFF"/>
-                </a:solidFill>
-                <a:latin typeface="Anaheim"/>
-                <a:ea typeface="Anaheim"/>
-                <a:cs typeface="Anaheim"/>
-                <a:sym typeface="Anaheim"/>
-              </a:rPr>
-              <a:t>“Locate me” option on map</a:t>
+              <a:t>Users can create and delete their own requests.</a:t>
             </a:r>
           </a:p>
           <a:p>
@@ -8206,7 +7962,102 @@
                 </a:solidFill>
                 <a:latin typeface="Anaheim"/>
               </a:rPr>
-              <a:t>notification of a new request or event according to the user's preferences, on a chosen radius of live or pre-determined location</a:t>
+              <a:t>User registration and login with securely stored details.</a:t>
+            </a:r>
+          </a:p>
+          <a:p>
+            <a:pPr marL="181463" indent="-146178" algn="l" defTabSz="362925" rtl="0">
+              <a:buClr>
+                <a:srgbClr val="80E4DC"/>
+              </a:buClr>
+              <a:buSzPts val="2200"/>
+              <a:buFont typeface="Anaheim"/>
+              <a:buChar char="●"/>
+            </a:pPr>
+            <a:r>
+              <a:rPr lang="en-US" sz="1200" kern="0" dirty="0">
+                <a:solidFill>
+                  <a:srgbClr val="FFFFFF"/>
+                </a:solidFill>
+                <a:latin typeface="Anaheim"/>
+              </a:rPr>
+              <a:t>A reliable, real-time, and interactive map shared among users.</a:t>
+            </a:r>
+          </a:p>
+          <a:p>
+            <a:pPr marL="181463" indent="-146178" algn="l" defTabSz="362925" rtl="0">
+              <a:buClr>
+                <a:srgbClr val="80E4DC"/>
+              </a:buClr>
+              <a:buSzPts val="2200"/>
+              <a:buFont typeface="Anaheim"/>
+              <a:buChar char="●"/>
+            </a:pPr>
+            <a:r>
+              <a:rPr lang="en-US" sz="1200" kern="0" dirty="0">
+                <a:solidFill>
+                  <a:srgbClr val="FFFFFF"/>
+                </a:solidFill>
+                <a:latin typeface="Anaheim"/>
+              </a:rPr>
+              <a:t>Seamless communication between application users.</a:t>
+            </a:r>
+          </a:p>
+          <a:p>
+            <a:pPr marL="181463" indent="-146178" algn="l" defTabSz="362925" rtl="0">
+              <a:buClr>
+                <a:srgbClr val="80E4DC"/>
+              </a:buClr>
+              <a:buSzPts val="2200"/>
+              <a:buFont typeface="Anaheim"/>
+              <a:buChar char="●"/>
+            </a:pPr>
+            <a:r>
+              <a:rPr lang="en-US" sz="1200" kern="0" dirty="0">
+                <a:solidFill>
+                  <a:srgbClr val="FFFFFF"/>
+                </a:solidFill>
+                <a:latin typeface="Anaheim"/>
+              </a:rPr>
+              <a:t>Requests are displayed on the map with dedicated icons.</a:t>
+            </a:r>
+          </a:p>
+          <a:p>
+            <a:pPr marL="181463" indent="-146178" algn="l" defTabSz="362925" rtl="0">
+              <a:buClr>
+                <a:srgbClr val="80E4DC"/>
+              </a:buClr>
+              <a:buSzPts val="2200"/>
+              <a:buFont typeface="Anaheim"/>
+              <a:buChar char="●"/>
+            </a:pPr>
+            <a:r>
+              <a:rPr lang="en-US" sz="1200" kern="0" dirty="0">
+                <a:solidFill>
+                  <a:srgbClr val="FFFFFF"/>
+                </a:solidFill>
+                <a:latin typeface="Anaheim"/>
+              </a:rPr>
+              <a:t>"Locate me" option to pinpoint the user's current location on the map.</a:t>
+            </a:r>
+          </a:p>
+          <a:p>
+            <a:pPr marL="181463" indent="-146178" algn="l" defTabSz="362925" rtl="0">
+              <a:buClr>
+                <a:srgbClr val="80E4DC"/>
+              </a:buClr>
+              <a:buSzPts val="2200"/>
+              <a:buFont typeface="Anaheim"/>
+              <a:buChar char="●"/>
+            </a:pPr>
+            <a:r>
+              <a:rPr lang="en-US" sz="1200" kern="0" dirty="0">
+                <a:solidFill>
+                  <a:srgbClr val="FFFFFF"/>
+                </a:solidFill>
+                <a:latin typeface="Anaheim"/>
+              </a:rPr>
+              <a:t>Notifications of new requests or events based on user preferences and within a selected radius of live or pre-determined locations.</a:t>
             </a:r>
             <a:br>
               <a:rPr lang="en-US" sz="1200" kern="0" dirty="0">
@@ -8280,7 +8131,7 @@
                 <a:cs typeface="Anaheim"/>
                 <a:sym typeface="Anaheim"/>
               </a:rPr>
-              <a:t> block users and delete requests</a:t>
+              <a:t> Ability to block users and delete requests.</a:t>
             </a:r>
           </a:p>
           <a:p>
@@ -8302,7 +8153,7 @@
                 <a:cs typeface="Anaheim"/>
                 <a:sym typeface="Anaheim"/>
               </a:rPr>
-              <a:t> add an event with a special icon</a:t>
+              <a:t> Option to add events with special icons.</a:t>
             </a:r>
           </a:p>
           <a:p>
@@ -8324,7 +8175,7 @@
                 <a:cs typeface="Anaheim"/>
                 <a:sym typeface="Anaheim"/>
               </a:rPr>
-              <a:t> watch users list &amp; users requests list</a:t>
+              <a:t> Access to users' lists and users' requests lists.</a:t>
             </a:r>
             <a:br>
               <a:rPr lang="en-US" sz="1200" kern="0" dirty="0">
@@ -8378,36 +8229,7 @@
                 <a:latin typeface="Anaheim"/>
                 <a:sym typeface="Poppins ExtraBold"/>
               </a:rPr>
-              <a:t>two-factor authentication</a:t>
-            </a:r>
-            <a:endParaRPr lang="en-US" sz="1200" kern="0" dirty="0">
-              <a:solidFill>
-                <a:srgbClr val="FFFFFF"/>
-              </a:solidFill>
-              <a:latin typeface="Anaheim"/>
-              <a:sym typeface="Anaheim"/>
-            </a:endParaRPr>
-          </a:p>
-          <a:p>
-            <a:pPr marL="181463" indent="-146178" algn="l" defTabSz="362925" rtl="0">
-              <a:buClr>
-                <a:srgbClr val="80E4DC"/>
-              </a:buClr>
-              <a:buSzPts val="2200"/>
-              <a:buFont typeface="Anaheim"/>
-              <a:buChar char="●"/>
-            </a:pPr>
-            <a:r>
-              <a:rPr lang="en-US" sz="1200" kern="0" dirty="0">
-                <a:solidFill>
-                  <a:srgbClr val="FFFFFF"/>
-                </a:solidFill>
-                <a:latin typeface="Anaheim"/>
-                <a:ea typeface="Anaheim"/>
-                <a:cs typeface="Anaheim"/>
-                <a:sym typeface="Anaheim"/>
-              </a:rPr>
-              <a:t>Requires university email verification to register users</a:t>
+              <a:t> Two-factor authentication for enhanced user protection.</a:t>
             </a:r>
           </a:p>
           <a:p>
@@ -8425,11 +8247,9 @@
                   <a:srgbClr val="FFFFFF"/>
                 </a:solidFill>
                 <a:latin typeface="Anaheim"/>
-                <a:ea typeface="Anaheim"/>
-                <a:cs typeface="Anaheim"/>
-                <a:sym typeface="Anaheim"/>
+                <a:sym typeface="Poppins ExtraBold"/>
               </a:rPr>
-              <a:t>Requires phone number verification by SMS code</a:t>
+              <a:t> User registration requires verification of the university email.</a:t>
             </a:r>
           </a:p>
           <a:p>
@@ -8447,12 +8267,29 @@
                   <a:srgbClr val="FFFFFF"/>
                 </a:solidFill>
                 <a:latin typeface="Anaheim"/>
-                <a:ea typeface="Anaheim"/>
-                <a:cs typeface="Anaheim"/>
-                <a:sym typeface="Anaheim"/>
+                <a:sym typeface="Poppins ExtraBold"/>
               </a:rPr>
-              <a:t>Enables users to report requests</a:t>
+              <a:t> Phone number verification is conducted through SMS codes to ensure user authenticity.</a:t>
             </a:r>
+          </a:p>
+          <a:p>
+            <a:pPr marL="181463" indent="-146178" algn="l" defTabSz="362925" rtl="0">
+              <a:buClr>
+                <a:srgbClr val="80E4DC"/>
+              </a:buClr>
+              <a:buSzPts val="2200"/>
+              <a:buFont typeface="Anaheim"/>
+              <a:buChar char="●"/>
+            </a:pPr>
+            <a:endParaRPr lang="en-US" sz="1200" kern="0" dirty="0">
+              <a:solidFill>
+                <a:srgbClr val="FFFFFF"/>
+              </a:solidFill>
+              <a:latin typeface="Anaheim"/>
+              <a:ea typeface="Anaheim"/>
+              <a:cs typeface="Anaheim"/>
+              <a:sym typeface="Anaheim"/>
+            </a:endParaRPr>
           </a:p>
         </p:txBody>
       </p:sp>
@@ -8464,7 +8301,7 @@
         </p:nvSpPr>
         <p:spPr>
           <a:xfrm>
-            <a:off x="2587241" y="1543149"/>
+            <a:off x="2559642" y="1377973"/>
             <a:ext cx="1984184" cy="362904"/>
           </a:xfrm>
           <a:prstGeom prst="rect">
@@ -8506,7 +8343,7 @@
         </p:nvSpPr>
         <p:spPr>
           <a:xfrm>
-            <a:off x="6812178" y="3827126"/>
+            <a:off x="6785595" y="3664163"/>
             <a:ext cx="1988708" cy="290275"/>
           </a:xfrm>
           <a:prstGeom prst="rect">
@@ -8551,7 +8388,7 @@
         </p:nvSpPr>
         <p:spPr>
           <a:xfrm>
-            <a:off x="8831671" y="5624090"/>
+            <a:off x="9287810" y="5864293"/>
             <a:ext cx="1988708" cy="217766"/>
           </a:xfrm>
           <a:prstGeom prst="rect">
@@ -8605,7 +8442,7 @@
         </p:nvSpPr>
         <p:spPr>
           <a:xfrm>
-            <a:off x="8853632" y="5956128"/>
+            <a:off x="9327753" y="6136544"/>
             <a:ext cx="1988708" cy="432556"/>
           </a:xfrm>
           <a:prstGeom prst="rect">
@@ -8715,7 +8552,7 @@
         </p:nvGrpSpPr>
         <p:grpSpPr>
           <a:xfrm>
-            <a:off x="4830323" y="1158451"/>
+            <a:off x="4856142" y="817146"/>
             <a:ext cx="289590" cy="290316"/>
             <a:chOff x="1151388" y="3752216"/>
             <a:chExt cx="1104061" cy="1103988"/>
@@ -11322,7 +11159,7 @@
         </p:nvGrpSpPr>
         <p:grpSpPr>
           <a:xfrm>
-            <a:off x="366617" y="1046608"/>
+            <a:off x="207215" y="745639"/>
             <a:ext cx="253433" cy="290316"/>
             <a:chOff x="5599286" y="3752216"/>
             <a:chExt cx="966210" cy="1103988"/>
@@ -12781,7 +12618,7 @@
         </p:nvGrpSpPr>
         <p:grpSpPr>
           <a:xfrm>
-            <a:off x="8484181" y="1144341"/>
+            <a:off x="8179844" y="951352"/>
             <a:ext cx="217759" cy="217759"/>
             <a:chOff x="14285477" y="3752216"/>
             <a:chExt cx="1103988" cy="1103988"/>
@@ -15527,7 +15364,7 @@
         </p:nvSpPr>
         <p:spPr>
           <a:xfrm>
-            <a:off x="2640714" y="5546076"/>
+            <a:off x="2613115" y="5379822"/>
             <a:ext cx="410648" cy="145138"/>
           </a:xfrm>
           <a:prstGeom prst="rect">
@@ -15569,7 +15406,7 @@
         </p:nvSpPr>
         <p:spPr>
           <a:xfrm>
-            <a:off x="4026309" y="5432803"/>
+            <a:off x="3998710" y="5266549"/>
             <a:ext cx="410648" cy="145138"/>
           </a:xfrm>
           <a:prstGeom prst="rect">
@@ -15611,7 +15448,7 @@
         </p:nvSpPr>
         <p:spPr>
           <a:xfrm>
-            <a:off x="3767553" y="5310979"/>
+            <a:off x="3739954" y="5144725"/>
             <a:ext cx="89059" cy="89059"/>
           </a:xfrm>
           <a:prstGeom prst="ellipse">
@@ -15652,7 +15489,7 @@
         </p:nvSpPr>
         <p:spPr>
           <a:xfrm>
-            <a:off x="4204180" y="6466758"/>
+            <a:off x="4176581" y="6300504"/>
             <a:ext cx="1871550" cy="217766"/>
           </a:xfrm>
           <a:prstGeom prst="rect">
@@ -15694,7 +15531,7 @@
         </p:nvSpPr>
         <p:spPr>
           <a:xfrm>
-            <a:off x="6866328" y="4955383"/>
+            <a:off x="6838729" y="4789129"/>
             <a:ext cx="1988708" cy="217766"/>
           </a:xfrm>
           <a:prstGeom prst="rect">
@@ -15736,7 +15573,7 @@
         </p:nvSpPr>
         <p:spPr>
           <a:xfrm>
-            <a:off x="6866328" y="5173099"/>
+            <a:off x="6838729" y="5006845"/>
             <a:ext cx="1988708" cy="537093"/>
           </a:xfrm>
           <a:prstGeom prst="rect">
@@ -15778,7 +15615,7 @@
         </p:nvGrpSpPr>
         <p:grpSpPr>
           <a:xfrm>
-            <a:off x="4312883" y="3720121"/>
+            <a:off x="4374495" y="3800934"/>
             <a:ext cx="793622" cy="820501"/>
             <a:chOff x="13958575" y="4743179"/>
             <a:chExt cx="4090986" cy="4229539"/>
@@ -17400,15 +17237,15 @@
           <p:nvPr/>
         </p:nvPicPr>
         <p:blipFill>
-          <a:blip r:embed="rId3"/>
+          <a:blip r:embed="rId4"/>
           <a:stretch>
             <a:fillRect/>
           </a:stretch>
         </p:blipFill>
         <p:spPr>
           <a:xfrm>
-            <a:off x="4749536" y="4812437"/>
-            <a:ext cx="3235015" cy="1841072"/>
+            <a:off x="5279550" y="5283436"/>
+            <a:ext cx="2759795" cy="1570621"/>
           </a:xfrm>
           <a:prstGeom prst="rect">
             <a:avLst/>
@@ -17433,7 +17270,7 @@
         </p:nvSpPr>
         <p:spPr>
           <a:xfrm>
-            <a:off x="5698347" y="2538790"/>
+            <a:off x="5335895" y="2489030"/>
             <a:ext cx="1829579" cy="262769"/>
           </a:xfrm>
           <a:prstGeom prst="rect">
@@ -17461,13 +17298,13 @@
                   <a:srgbClr val="FFFFFF"/>
                 </a:solidFill>
                 <a:latin typeface="Poppins ExtraBold"/>
-                <a:ea typeface="Poppins ExtraBold"/>
+                <a:ea typeface="Anaheim"/>
                 <a:cs typeface="Poppins ExtraBold"/>
                 <a:sym typeface="Poppins ExtraBold"/>
               </a:rPr>
-              <a:t>METHODS</a:t>
+              <a:t>IMPLEMENTATION</a:t>
             </a:r>
-            <a:endParaRPr sz="1600" kern="0" dirty="0">
+            <a:endParaRPr lang="en-IL" sz="1600" kern="0" dirty="0">
               <a:solidFill>
                 <a:srgbClr val="FFFFFF"/>
               </a:solidFill>
@@ -17494,15 +17331,15 @@
           <p:nvPr/>
         </p:nvPicPr>
         <p:blipFill>
-          <a:blip r:embed="rId4"/>
+          <a:blip r:embed="rId5"/>
           <a:stretch>
             <a:fillRect/>
           </a:stretch>
         </p:blipFill>
         <p:spPr>
           <a:xfrm>
-            <a:off x="2489178" y="1711383"/>
-            <a:ext cx="1385229" cy="2510614"/>
+            <a:off x="2602810" y="1350713"/>
+            <a:ext cx="1354319" cy="2454593"/>
           </a:xfrm>
           <a:prstGeom prst="rect">
             <a:avLst/>
@@ -17549,14 +17386,14 @@
           <p:nvPr/>
         </p:nvPicPr>
         <p:blipFill>
-          <a:blip r:embed="rId5"/>
+          <a:blip r:embed="rId6"/>
           <a:stretch>
             <a:fillRect/>
           </a:stretch>
         </p:blipFill>
         <p:spPr>
           <a:xfrm>
-            <a:off x="3052382" y="4332244"/>
+            <a:off x="3200355" y="4041661"/>
             <a:ext cx="1545067" cy="2385545"/>
           </a:xfrm>
           <a:prstGeom prst="rect">
@@ -17604,15 +17441,15 @@
           <p:nvPr/>
         </p:nvPicPr>
         <p:blipFill>
-          <a:blip r:embed="rId6"/>
+          <a:blip r:embed="rId7"/>
           <a:stretch>
             <a:fillRect/>
           </a:stretch>
         </p:blipFill>
         <p:spPr>
           <a:xfrm>
-            <a:off x="3792878" y="1813412"/>
-            <a:ext cx="1425771" cy="2115473"/>
+            <a:off x="3785695" y="1590896"/>
+            <a:ext cx="1307457" cy="1939926"/>
           </a:xfrm>
           <a:prstGeom prst="rect">
             <a:avLst/>
@@ -17655,8 +17492,8 @@
         </p:nvSpPr>
         <p:spPr>
           <a:xfrm>
-            <a:off x="5227868" y="2770917"/>
-            <a:ext cx="3603803" cy="1200329"/>
+            <a:off x="5075072" y="2702906"/>
+            <a:ext cx="3380259" cy="1754326"/>
           </a:xfrm>
           <a:prstGeom prst="rect">
             <a:avLst/>
@@ -17687,7 +17524,7 @@
                 <a:cs typeface="Anaheim"/>
                 <a:sym typeface="Anaheim"/>
               </a:rPr>
-              <a:t>Java Android components</a:t>
+              <a:t> Java Android components for the app's functionality.</a:t>
             </a:r>
           </a:p>
           <a:p>
@@ -17709,7 +17546,7 @@
                 <a:cs typeface="Anaheim"/>
                 <a:sym typeface="Anaheim"/>
               </a:rPr>
-              <a:t>HTML, CSS for Client UI</a:t>
+              <a:t> HTML and CSS for the client-side user interface.</a:t>
             </a:r>
           </a:p>
           <a:p>
@@ -17729,7 +17566,7 @@
                 <a:latin typeface="Anaheim"/>
                 <a:sym typeface="Anaheim"/>
               </a:rPr>
-              <a:t>Cloud Database</a:t>
+              <a:t>Cloud-based database for data management.</a:t>
             </a:r>
           </a:p>
           <a:p>
@@ -17749,7 +17586,7 @@
                 <a:latin typeface="Anaheim"/>
                 <a:sym typeface="Anaheim"/>
               </a:rPr>
-              <a:t>Python server API</a:t>
+              <a:t> Python server API for handling server-side operations.</a:t>
             </a:r>
           </a:p>
           <a:p>
@@ -17767,9 +17604,8 @@
                   <a:srgbClr val="FFFFFF"/>
                 </a:solidFill>
                 <a:latin typeface="Anaheim"/>
-                <a:sym typeface="Anaheim"/>
               </a:rPr>
-              <a:t>Map service integration</a:t>
+              <a:t> Seamless integration of the map service.</a:t>
             </a:r>
           </a:p>
           <a:p>
@@ -17787,11 +17623,15 @@
                   <a:srgbClr val="FFFFFF"/>
                 </a:solidFill>
                 <a:latin typeface="Anaheim"/>
-                <a:sym typeface="Anaheim"/>
               </a:rPr>
-              <a:t>GPS sensor activation</a:t>
+              <a:t> Activation of the GPS sensor to ensure accurate location tracking.</a:t>
             </a:r>
-            <a:endParaRPr lang="LID4096" sz="1200" dirty="0"/>
+            <a:endParaRPr lang="LID4096" sz="1200" kern="0" dirty="0">
+              <a:solidFill>
+                <a:srgbClr val="FFFFFF"/>
+              </a:solidFill>
+              <a:latin typeface="Anaheim"/>
+            </a:endParaRPr>
           </a:p>
         </p:txBody>
       </p:sp>
@@ -17810,7 +17650,7 @@
           <p:nvPr/>
         </p:nvPicPr>
         <p:blipFill>
-          <a:blip r:embed="rId7">
+          <a:blip r:embed="rId8">
             <a:extLst>
               <a:ext uri="{28A0092B-C50C-407E-A947-70E740481C1C}">
                 <a14:useLocalDpi xmlns:a14="http://schemas.microsoft.com/office/drawing/2010/main" val="0"/>
@@ -17824,8 +17664,8 @@
         </p:blipFill>
         <p:spPr bwMode="auto">
           <a:xfrm>
-            <a:off x="7403202" y="2706966"/>
-            <a:ext cx="653636" cy="933766"/>
+            <a:off x="7847059" y="2244342"/>
+            <a:ext cx="511098" cy="730140"/>
           </a:xfrm>
           <a:prstGeom prst="rect">
             <a:avLst/>
@@ -17857,7 +17697,7 @@
           <p:nvPr/>
         </p:nvPicPr>
         <p:blipFill>
-          <a:blip r:embed="rId8">
+          <a:blip r:embed="rId9">
             <a:extLst>
               <a:ext uri="{28A0092B-C50C-407E-A947-70E740481C1C}">
                 <a14:useLocalDpi xmlns:a14="http://schemas.microsoft.com/office/drawing/2010/main" val="0"/>
@@ -17871,7 +17711,7 @@
         </p:blipFill>
         <p:spPr bwMode="auto">
           <a:xfrm>
-            <a:off x="11395669" y="1375821"/>
+            <a:off x="11395669" y="967268"/>
             <a:ext cx="796331" cy="732046"/>
           </a:xfrm>
           <a:prstGeom prst="rect">
@@ -17904,14 +17744,14 @@
           <p:nvPr/>
         </p:nvPicPr>
         <p:blipFill>
-          <a:blip r:embed="rId9"/>
+          <a:blip r:embed="rId10"/>
           <a:stretch>
             <a:fillRect/>
           </a:stretch>
         </p:blipFill>
         <p:spPr>
           <a:xfrm>
-            <a:off x="157949" y="84125"/>
+            <a:off x="164150" y="28018"/>
             <a:ext cx="1274871" cy="494726"/>
           </a:xfrm>
           <a:prstGeom prst="rect">
@@ -17934,7 +17774,7 @@
           <p:nvPr/>
         </p:nvPicPr>
         <p:blipFill>
-          <a:blip r:embed="rId10">
+          <a:blip r:embed="rId11">
             <a:extLst>
               <a:ext uri="{28A0092B-C50C-407E-A947-70E740481C1C}">
                 <a14:useLocalDpi xmlns:a14="http://schemas.microsoft.com/office/drawing/2010/main" val="0"/>
@@ -17948,55 +17788,8 @@
         </p:blipFill>
         <p:spPr bwMode="auto">
           <a:xfrm rot="307138">
-            <a:off x="11289194" y="3973836"/>
+            <a:off x="11280422" y="4106586"/>
             <a:ext cx="756811" cy="756811"/>
-          </a:xfrm>
-          <a:prstGeom prst="rect">
-            <a:avLst/>
-          </a:prstGeom>
-          <a:noFill/>
-          <a:extLst>
-            <a:ext uri="{909E8E84-426E-40DD-AFC4-6F175D3DCCD1}">
-              <a14:hiddenFill xmlns:a14="http://schemas.microsoft.com/office/drawing/2010/main">
-                <a:solidFill>
-                  <a:srgbClr val="FFFFFF"/>
-                </a:solidFill>
-              </a14:hiddenFill>
-            </a:ext>
-          </a:extLst>
-        </p:spPr>
-      </p:pic>
-      <p:pic>
-        <p:nvPicPr>
-          <p:cNvPr id="1070" name="Picture 46" descr="Admin Svg Png Icon Free Download (#537428) - OnlineWebFonts.COM">
-            <a:extLst>
-              <a:ext uri="{FF2B5EF4-FFF2-40B4-BE49-F238E27FC236}">
-                <a16:creationId xmlns:a16="http://schemas.microsoft.com/office/drawing/2014/main" id="{BC3BBCD9-C639-9B0C-E161-0B349DF4C4F3}"/>
-              </a:ext>
-            </a:extLst>
-          </p:cNvPr>
-          <p:cNvPicPr>
-            <a:picLocks noChangeAspect="1" noChangeArrowheads="1"/>
-          </p:cNvPicPr>
-          <p:nvPr/>
-        </p:nvPicPr>
-        <p:blipFill>
-          <a:blip r:embed="rId11">
-            <a:extLst>
-              <a:ext uri="{28A0092B-C50C-407E-A947-70E740481C1C}">
-                <a14:useLocalDpi xmlns:a14="http://schemas.microsoft.com/office/drawing/2010/main" val="0"/>
-              </a:ext>
-            </a:extLst>
-          </a:blip>
-          <a:srcRect/>
-          <a:stretch>
-            <a:fillRect/>
-          </a:stretch>
-        </p:blipFill>
-        <p:spPr bwMode="auto">
-          <a:xfrm rot="21423691">
-            <a:off x="10742679" y="3338765"/>
-            <a:ext cx="603932" cy="728971"/>
           </a:xfrm>
           <a:prstGeom prst="rect">
             <a:avLst/>
@@ -18041,7 +17834,7 @@
         </p:blipFill>
         <p:spPr>
           <a:xfrm>
-            <a:off x="10842340" y="5631676"/>
+            <a:off x="11236574" y="5824008"/>
             <a:ext cx="815109" cy="815109"/>
           </a:xfrm>
           <a:prstGeom prst="rect">

</xml_diff>